<commit_message>
-Änderungen an der Powerpoin HowToWTX. -Nach Klicken des "Refresh GUI Standard/Filler"-Buttons wurden die Werte nicht direkt angezeigt, erst bei Änderung des Messswerts-Wurde korrigiert. -Aktualisierung der Toolstrip bar war einmal überflüssig und wurde deshalb entfernt.
</commit_message>
<xml_diff>
--- a/Doc/HowTo-WTXModbus.pptx
+++ b/Doc/HowTo-WTXModbus.pptx
@@ -253,7 +253,7 @@
           <a:p>
             <a:fld id="{6753907E-F3CE-4E8A-8F4A-8FE8BFAF45B9}" type="datetimeFigureOut">
               <a:rPr lang="de-DE" smtClean="0"/>
-              <a:t>24.05.2018</a:t>
+              <a:t>30.05.2018</a:t>
             </a:fld>
             <a:endParaRPr lang="de-DE"/>
           </a:p>
@@ -448,7 +448,7 @@
               <a:pPr>
                 <a:defRPr/>
               </a:pPr>
-              <a:t>24/05/2018</a:t>
+              <a:t>30/05/2018</a:t>
             </a:fld>
             <a:endParaRPr lang="en-GB"/>
           </a:p>
@@ -17432,7 +17432,15 @@
           <a:p>
             <a:r>
               <a:rPr lang="en-US" dirty="0" smtClean="0"/>
-              <a:t>All implementations work with same classes WTX120Modbus, </a:t>
+              <a:t>All implementations work with same </a:t>
+            </a:r>
+            <a:r>
+              <a:rPr lang="en-US" dirty="0" smtClean="0"/>
+              <a:t>the classes </a:t>
+            </a:r>
+            <a:r>
+              <a:rPr lang="en-US" dirty="0" smtClean="0"/>
+              <a:t>WTX120Modbus, </a:t>
             </a:r>
             <a:r>
               <a:rPr lang="en-US" dirty="0" err="1" smtClean="0"/>
@@ -17845,6 +17853,14 @@
             </a:r>
             <a:r>
               <a:rPr lang="de-DE" dirty="0" err="1" smtClean="0"/>
+              <a:t>together</a:t>
+            </a:r>
+            <a:r>
+              <a:rPr lang="de-DE" dirty="0" smtClean="0"/>
+              <a:t> </a:t>
+            </a:r>
+            <a:r>
+              <a:rPr lang="de-DE" dirty="0" err="1" smtClean="0"/>
               <a:t>is</a:t>
             </a:r>
             <a:r>
@@ -17901,27 +17917,11 @@
             </a:r>
             <a:r>
               <a:rPr lang="de-DE" dirty="0" err="1" smtClean="0"/>
-              <a:t>to</a:t>
+              <a:t>redundance</a:t>
             </a:r>
             <a:r>
               <a:rPr lang="de-DE" dirty="0" smtClean="0"/>
-              <a:t> </a:t>
-            </a:r>
-            <a:r>
-              <a:rPr lang="de-DE" dirty="0" err="1" smtClean="0"/>
-              <a:t>get</a:t>
-            </a:r>
-            <a:r>
-              <a:rPr lang="de-DE" dirty="0" smtClean="0"/>
-              <a:t> a redundant </a:t>
-            </a:r>
-            <a:r>
-              <a:rPr lang="de-DE" dirty="0" err="1" smtClean="0"/>
-              <a:t>system</a:t>
-            </a:r>
-            <a:r>
-              <a:rPr lang="de-DE" dirty="0" smtClean="0"/>
-              <a:t>. </a:t>
+              <a:t>.</a:t>
             </a:r>
             <a:endParaRPr lang="en-US" dirty="0" smtClean="0"/>
           </a:p>
@@ -18211,7 +18211,11 @@
             </a:r>
             <a:r>
               <a:rPr lang="en-US" dirty="0"/>
-              <a:t>Collection : “Alter Stand”</a:t>
+              <a:t>Collection </a:t>
+            </a:r>
+            <a:r>
+              <a:rPr lang="en-US" dirty="0" smtClean="0"/>
+              <a:t>:</a:t>
             </a:r>
             <a:endParaRPr lang="de-DE" dirty="0"/>
           </a:p>

</xml_diff>

<commit_message>
-In HowTo Powerpoint - Klammer in Beispielcode ergänzt. -IN WTXModbusGUI : Schreiben aller Output-Datenwörter für die Standard und Filler Application über Datagrid sobald ein Zellenwert in der Reihe und Spalte sich durch Eingabe ändert. Schreiben auf die WTX120 als nächsten Schritt am Mittwoch (6.6.18).
</commit_message>
<xml_diff>
--- a/Doc/HowTo-WTXModbus.pptx
+++ b/Doc/HowTo-WTXModbus.pptx
@@ -253,7 +253,7 @@
           <a:p>
             <a:fld id="{6753907E-F3CE-4E8A-8F4A-8FE8BFAF45B9}" type="datetimeFigureOut">
               <a:rPr lang="de-DE" smtClean="0"/>
-              <a:t>30.05.2018</a:t>
+              <a:t>04.06.2018</a:t>
             </a:fld>
             <a:endParaRPr lang="de-DE"/>
           </a:p>
@@ -448,7 +448,7 @@
               <a:pPr>
                 <a:defRPr/>
               </a:pPr>
-              <a:t>30/05/2018</a:t>
+              <a:t>04/06/2018</a:t>
             </a:fld>
             <a:endParaRPr lang="en-GB"/>
           </a:p>
@@ -9287,7 +9287,7 @@
                 <a:latin typeface="Consolas" panose="020B0609020204030204" pitchFamily="49" charset="0"/>
                 <a:cs typeface="Consolas" panose="020B0609020204030204" pitchFamily="49" charset="0"/>
               </a:rPr>
-              <a:t>WTX120Modbus </a:t>
+              <a:t>WTX120Modbus(</a:t>
             </a:r>
             <a:r>
               <a:rPr lang="en-US" sz="1200" dirty="0" err="1" smtClean="0">
@@ -17432,15 +17432,7 @@
           <a:p>
             <a:r>
               <a:rPr lang="en-US" dirty="0" smtClean="0"/>
-              <a:t>All implementations work with same </a:t>
-            </a:r>
-            <a:r>
-              <a:rPr lang="en-US" dirty="0" smtClean="0"/>
-              <a:t>the classes </a:t>
-            </a:r>
-            <a:r>
-              <a:rPr lang="en-US" dirty="0" smtClean="0"/>
-              <a:t>WTX120Modbus, </a:t>
+              <a:t>All implementations work with same the classes WTX120Modbus, </a:t>
             </a:r>
             <a:r>
               <a:rPr lang="en-US" dirty="0" err="1" smtClean="0"/>

</xml_diff>